<commit_message>
Change Picture for DG
</commit_message>
<xml_diff>
--- a/docs/diagrams/LogicComponentClassDiagram.pptx
+++ b/docs/diagrams/LogicComponentClassDiagram.pptx
@@ -212,7 +212,7 @@
           <a:p>
             <a:fld id="{F5CC4B3F-88C1-4FFA-B1B6-F41C21DC6924}" type="datetimeFigureOut">
               <a:rPr lang="en-US" smtClean="0"/>
-              <a:t>4/16/2018</a:t>
+              <a:t>4/13/19</a:t>
             </a:fld>
             <a:endParaRPr lang="en-US"/>
           </a:p>
@@ -658,7 +658,7 @@
           <a:p>
             <a:fld id="{78C97017-6FC3-485B-9764-EAC9E56C1D49}" type="datetimeFigureOut">
               <a:rPr lang="en-US" smtClean="0"/>
-              <a:t>4/16/2018</a:t>
+              <a:t>4/13/19</a:t>
             </a:fld>
             <a:endParaRPr lang="en-US"/>
           </a:p>
@@ -826,7 +826,7 @@
           <a:p>
             <a:fld id="{78C97017-6FC3-485B-9764-EAC9E56C1D49}" type="datetimeFigureOut">
               <a:rPr lang="en-US" smtClean="0"/>
-              <a:t>4/16/2018</a:t>
+              <a:t>4/13/19</a:t>
             </a:fld>
             <a:endParaRPr lang="en-US"/>
           </a:p>
@@ -1004,7 +1004,7 @@
           <a:p>
             <a:fld id="{78C97017-6FC3-485B-9764-EAC9E56C1D49}" type="datetimeFigureOut">
               <a:rPr lang="en-US" smtClean="0"/>
-              <a:t>4/16/2018</a:t>
+              <a:t>4/13/19</a:t>
             </a:fld>
             <a:endParaRPr lang="en-US"/>
           </a:p>
@@ -1172,7 +1172,7 @@
           <a:p>
             <a:fld id="{78C97017-6FC3-485B-9764-EAC9E56C1D49}" type="datetimeFigureOut">
               <a:rPr lang="en-US" smtClean="0"/>
-              <a:t>4/16/2018</a:t>
+              <a:t>4/13/19</a:t>
             </a:fld>
             <a:endParaRPr lang="en-US"/>
           </a:p>
@@ -1417,7 +1417,7 @@
           <a:p>
             <a:fld id="{78C97017-6FC3-485B-9764-EAC9E56C1D49}" type="datetimeFigureOut">
               <a:rPr lang="en-US" smtClean="0"/>
-              <a:t>4/16/2018</a:t>
+              <a:t>4/13/19</a:t>
             </a:fld>
             <a:endParaRPr lang="en-US"/>
           </a:p>
@@ -1702,7 +1702,7 @@
           <a:p>
             <a:fld id="{78C97017-6FC3-485B-9764-EAC9E56C1D49}" type="datetimeFigureOut">
               <a:rPr lang="en-US" smtClean="0"/>
-              <a:t>4/16/2018</a:t>
+              <a:t>4/13/19</a:t>
             </a:fld>
             <a:endParaRPr lang="en-US"/>
           </a:p>
@@ -2121,7 +2121,7 @@
           <a:p>
             <a:fld id="{78C97017-6FC3-485B-9764-EAC9E56C1D49}" type="datetimeFigureOut">
               <a:rPr lang="en-US" smtClean="0"/>
-              <a:t>4/16/2018</a:t>
+              <a:t>4/13/19</a:t>
             </a:fld>
             <a:endParaRPr lang="en-US"/>
           </a:p>
@@ -2238,7 +2238,7 @@
           <a:p>
             <a:fld id="{78C97017-6FC3-485B-9764-EAC9E56C1D49}" type="datetimeFigureOut">
               <a:rPr lang="en-US" smtClean="0"/>
-              <a:t>4/16/2018</a:t>
+              <a:t>4/13/19</a:t>
             </a:fld>
             <a:endParaRPr lang="en-US"/>
           </a:p>
@@ -2333,7 +2333,7 @@
           <a:p>
             <a:fld id="{78C97017-6FC3-485B-9764-EAC9E56C1D49}" type="datetimeFigureOut">
               <a:rPr lang="en-US" smtClean="0"/>
-              <a:t>4/16/2018</a:t>
+              <a:t>4/13/19</a:t>
             </a:fld>
             <a:endParaRPr lang="en-US"/>
           </a:p>
@@ -2608,7 +2608,7 @@
           <a:p>
             <a:fld id="{78C97017-6FC3-485B-9764-EAC9E56C1D49}" type="datetimeFigureOut">
               <a:rPr lang="en-US" smtClean="0"/>
-              <a:t>4/16/2018</a:t>
+              <a:t>4/13/19</a:t>
             </a:fld>
             <a:endParaRPr lang="en-US"/>
           </a:p>
@@ -2860,7 +2860,7 @@
           <a:p>
             <a:fld id="{78C97017-6FC3-485B-9764-EAC9E56C1D49}" type="datetimeFigureOut">
               <a:rPr lang="en-US" smtClean="0"/>
-              <a:t>4/16/2018</a:t>
+              <a:t>4/13/19</a:t>
             </a:fld>
             <a:endParaRPr lang="en-US"/>
           </a:p>
@@ -3071,7 +3071,7 @@
           <a:p>
             <a:fld id="{78C97017-6FC3-485B-9764-EAC9E56C1D49}" type="datetimeFigureOut">
               <a:rPr lang="en-US" smtClean="0"/>
-              <a:t>4/16/2018</a:t>
+              <a:t>4/13/19</a:t>
             </a:fld>
             <a:endParaRPr lang="en-US"/>
           </a:p>
@@ -3939,12 +3939,12 @@
           <a:p>
             <a:pPr algn="ctr"/>
             <a:r>
-              <a:rPr lang="en-US" sz="1050" dirty="0" err="1" smtClean="0">
+              <a:rPr lang="en-US" sz="1050" smtClean="0">
                 <a:solidFill>
                   <a:schemeClr val="bg1"/>
                 </a:solidFill>
               </a:rPr>
-              <a:t>AddressBook</a:t>
+              <a:t>UltiStudent</a:t>
             </a:r>
             <a:endParaRPr lang="en-US" sz="1050" dirty="0">
               <a:solidFill>
@@ -5517,7 +5517,7 @@
           <p:cNvPr id="97" name="Rectangle 96">
             <a:extLst>
               <a:ext uri="{FF2B5EF4-FFF2-40B4-BE49-F238E27FC236}">
-                <a16:creationId xmlns:a16="http://schemas.microsoft.com/office/drawing/2014/main" id="{AADE6A0C-89AB-467B-8CEA-5FCF36CE0D21}"/>
+                <a16:creationId xmlns:a16="http://schemas.microsoft.com/office/drawing/2014/main" xmlns="" id="{AADE6A0C-89AB-467B-8CEA-5FCF36CE0D21}"/>
               </a:ext>
             </a:extLst>
           </p:cNvPr>

</xml_diff>